<commit_message>
Chapter 7 first review done
</commit_message>
<xml_diff>
--- a/Word/Diagrams/chapter7/Chap7.figures.pptx
+++ b/Word/Diagrams/chapter7/Chap7.figures.pptx
@@ -215,7 +215,7 @@
             <a:fld id="{9CCF083D-F2BC-4786-8C77-844DFCD3515B}" type="datetimeFigureOut">
               <a:rPr lang="zh-TW" altLang="en-US" smtClean="0"/>
               <a:pPr/>
-              <a:t>2015/6/18</a:t>
+              <a:t>2021/4/28</a:t>
             </a:fld>
             <a:endParaRPr lang="zh-TW" altLang="en-US"/>
           </a:p>
@@ -279,35 +279,35 @@
           <a:p>
             <a:pPr lvl="0"/>
             <a:r>
-              <a:rPr lang="en-US" altLang="zh-TW" smtClean="0"/>
+              <a:rPr lang="en-US" altLang="zh-TW"/>
               <a:t>Click to edit Master text styles</a:t>
             </a:r>
           </a:p>
           <a:p>
             <a:pPr lvl="1"/>
             <a:r>
-              <a:rPr lang="en-US" altLang="zh-TW" smtClean="0"/>
+              <a:rPr lang="en-US" altLang="zh-TW"/>
               <a:t>Second level</a:t>
             </a:r>
           </a:p>
           <a:p>
             <a:pPr lvl="2"/>
             <a:r>
-              <a:rPr lang="en-US" altLang="zh-TW" smtClean="0"/>
+              <a:rPr lang="en-US" altLang="zh-TW"/>
               <a:t>Third level</a:t>
             </a:r>
           </a:p>
           <a:p>
             <a:pPr lvl="3"/>
             <a:r>
-              <a:rPr lang="en-US" altLang="zh-TW" smtClean="0"/>
+              <a:rPr lang="en-US" altLang="zh-TW"/>
               <a:t>Fourth level</a:t>
             </a:r>
           </a:p>
           <a:p>
             <a:pPr lvl="4"/>
             <a:r>
-              <a:rPr lang="en-US" altLang="zh-TW" smtClean="0"/>
+              <a:rPr lang="en-US" altLang="zh-TW"/>
               <a:t>Fifth level</a:t>
             </a:r>
             <a:endParaRPr lang="zh-TW" altLang="en-US"/>
@@ -694,10 +694,9 @@
           <a:lstStyle/>
           <a:p>
             <a:r>
-              <a:rPr lang="en-US" smtClean="0"/>
+              <a:rPr lang="en-US"/>
               <a:t>Click to edit Master title style</a:t>
             </a:r>
-            <a:endParaRPr lang="en-US"/>
           </a:p>
         </p:txBody>
       </p:sp>
@@ -813,10 +812,9 @@
           </a:lstStyle>
           <a:p>
             <a:r>
-              <a:rPr lang="en-US" smtClean="0"/>
+              <a:rPr lang="en-US"/>
               <a:t>Click to edit Master subtitle style</a:t>
             </a:r>
-            <a:endParaRPr lang="en-US"/>
           </a:p>
         </p:txBody>
       </p:sp>
@@ -838,7 +836,7 @@
             <a:fld id="{E3D07B0C-BD95-41BE-BB3E-AC75822DF381}" type="datetimeFigureOut">
               <a:rPr lang="en-US" smtClean="0"/>
               <a:pPr/>
-              <a:t>6/18/2015</a:t>
+              <a:t>4/28/2021</a:t>
             </a:fld>
             <a:endParaRPr lang="en-US"/>
           </a:p>
@@ -933,10 +931,9 @@
           <a:lstStyle/>
           <a:p>
             <a:r>
-              <a:rPr lang="en-US" smtClean="0"/>
+              <a:rPr lang="en-US"/>
               <a:t>Click to edit Master title style</a:t>
             </a:r>
-            <a:endParaRPr lang="en-US"/>
           </a:p>
         </p:txBody>
       </p:sp>
@@ -957,38 +954,37 @@
           <a:p>
             <a:pPr lvl="0"/>
             <a:r>
-              <a:rPr lang="en-US" smtClean="0"/>
+              <a:rPr lang="en-US"/>
               <a:t>Click to edit Master text styles</a:t>
             </a:r>
           </a:p>
           <a:p>
             <a:pPr lvl="1"/>
             <a:r>
-              <a:rPr lang="en-US" smtClean="0"/>
+              <a:rPr lang="en-US"/>
               <a:t>Second level</a:t>
             </a:r>
           </a:p>
           <a:p>
             <a:pPr lvl="2"/>
             <a:r>
-              <a:rPr lang="en-US" smtClean="0"/>
+              <a:rPr lang="en-US"/>
               <a:t>Third level</a:t>
             </a:r>
           </a:p>
           <a:p>
             <a:pPr lvl="3"/>
             <a:r>
-              <a:rPr lang="en-US" smtClean="0"/>
+              <a:rPr lang="en-US"/>
               <a:t>Fourth level</a:t>
             </a:r>
           </a:p>
           <a:p>
             <a:pPr lvl="4"/>
             <a:r>
-              <a:rPr lang="en-US" smtClean="0"/>
+              <a:rPr lang="en-US"/>
               <a:t>Fifth level</a:t>
             </a:r>
-            <a:endParaRPr lang="en-US"/>
           </a:p>
         </p:txBody>
       </p:sp>
@@ -1010,7 +1006,7 @@
             <a:fld id="{E3D07B0C-BD95-41BE-BB3E-AC75822DF381}" type="datetimeFigureOut">
               <a:rPr lang="en-US" smtClean="0"/>
               <a:pPr/>
-              <a:t>6/18/2015</a:t>
+              <a:t>4/28/2021</a:t>
             </a:fld>
             <a:endParaRPr lang="en-US"/>
           </a:p>
@@ -1110,10 +1106,9 @@
           <a:lstStyle/>
           <a:p>
             <a:r>
-              <a:rPr lang="en-US" smtClean="0"/>
+              <a:rPr lang="en-US"/>
               <a:t>Click to edit Master title style</a:t>
             </a:r>
-            <a:endParaRPr lang="en-US"/>
           </a:p>
         </p:txBody>
       </p:sp>
@@ -1139,38 +1134,37 @@
           <a:p>
             <a:pPr lvl="0"/>
             <a:r>
-              <a:rPr lang="en-US" smtClean="0"/>
+              <a:rPr lang="en-US"/>
               <a:t>Click to edit Master text styles</a:t>
             </a:r>
           </a:p>
           <a:p>
             <a:pPr lvl="1"/>
             <a:r>
-              <a:rPr lang="en-US" smtClean="0"/>
+              <a:rPr lang="en-US"/>
               <a:t>Second level</a:t>
             </a:r>
           </a:p>
           <a:p>
             <a:pPr lvl="2"/>
             <a:r>
-              <a:rPr lang="en-US" smtClean="0"/>
+              <a:rPr lang="en-US"/>
               <a:t>Third level</a:t>
             </a:r>
           </a:p>
           <a:p>
             <a:pPr lvl="3"/>
             <a:r>
-              <a:rPr lang="en-US" smtClean="0"/>
+              <a:rPr lang="en-US"/>
               <a:t>Fourth level</a:t>
             </a:r>
           </a:p>
           <a:p>
             <a:pPr lvl="4"/>
             <a:r>
-              <a:rPr lang="en-US" smtClean="0"/>
+              <a:rPr lang="en-US"/>
               <a:t>Fifth level</a:t>
             </a:r>
-            <a:endParaRPr lang="en-US"/>
           </a:p>
         </p:txBody>
       </p:sp>
@@ -1192,7 +1186,7 @@
             <a:fld id="{E3D07B0C-BD95-41BE-BB3E-AC75822DF381}" type="datetimeFigureOut">
               <a:rPr lang="en-US" smtClean="0"/>
               <a:pPr/>
-              <a:t>6/18/2015</a:t>
+              <a:t>4/28/2021</a:t>
             </a:fld>
             <a:endParaRPr lang="en-US"/>
           </a:p>
@@ -1287,10 +1281,9 @@
           <a:lstStyle/>
           <a:p>
             <a:r>
-              <a:rPr lang="en-US" smtClean="0"/>
+              <a:rPr lang="en-US"/>
               <a:t>Click to edit Master title style</a:t>
             </a:r>
-            <a:endParaRPr lang="en-US"/>
           </a:p>
         </p:txBody>
       </p:sp>
@@ -1311,38 +1304,37 @@
           <a:p>
             <a:pPr lvl="0"/>
             <a:r>
-              <a:rPr lang="en-US" smtClean="0"/>
+              <a:rPr lang="en-US"/>
               <a:t>Click to edit Master text styles</a:t>
             </a:r>
           </a:p>
           <a:p>
             <a:pPr lvl="1"/>
             <a:r>
-              <a:rPr lang="en-US" smtClean="0"/>
+              <a:rPr lang="en-US"/>
               <a:t>Second level</a:t>
             </a:r>
           </a:p>
           <a:p>
             <a:pPr lvl="2"/>
             <a:r>
-              <a:rPr lang="en-US" smtClean="0"/>
+              <a:rPr lang="en-US"/>
               <a:t>Third level</a:t>
             </a:r>
           </a:p>
           <a:p>
             <a:pPr lvl="3"/>
             <a:r>
-              <a:rPr lang="en-US" smtClean="0"/>
+              <a:rPr lang="en-US"/>
               <a:t>Fourth level</a:t>
             </a:r>
           </a:p>
           <a:p>
             <a:pPr lvl="4"/>
             <a:r>
-              <a:rPr lang="en-US" smtClean="0"/>
+              <a:rPr lang="en-US"/>
               <a:t>Fifth level</a:t>
             </a:r>
-            <a:endParaRPr lang="en-US"/>
           </a:p>
         </p:txBody>
       </p:sp>
@@ -1364,7 +1356,7 @@
             <a:fld id="{E3D07B0C-BD95-41BE-BB3E-AC75822DF381}" type="datetimeFigureOut">
               <a:rPr lang="en-US" smtClean="0"/>
               <a:pPr/>
-              <a:t>6/18/2015</a:t>
+              <a:t>4/28/2021</a:t>
             </a:fld>
             <a:endParaRPr lang="en-US"/>
           </a:p>
@@ -1468,10 +1460,9 @@
           </a:lstStyle>
           <a:p>
             <a:r>
-              <a:rPr lang="en-US" smtClean="0"/>
+              <a:rPr lang="en-US"/>
               <a:t>Click to edit Master title style</a:t>
             </a:r>
-            <a:endParaRPr lang="en-US"/>
           </a:p>
         </p:txBody>
       </p:sp>
@@ -1588,7 +1579,7 @@
           <a:p>
             <a:pPr lvl="0"/>
             <a:r>
-              <a:rPr lang="en-US" smtClean="0"/>
+              <a:rPr lang="en-US"/>
               <a:t>Click to edit Master text styles</a:t>
             </a:r>
           </a:p>
@@ -1612,7 +1603,7 @@
             <a:fld id="{E3D07B0C-BD95-41BE-BB3E-AC75822DF381}" type="datetimeFigureOut">
               <a:rPr lang="en-US" smtClean="0"/>
               <a:pPr/>
-              <a:t>6/18/2015</a:t>
+              <a:t>4/28/2021</a:t>
             </a:fld>
             <a:endParaRPr lang="en-US"/>
           </a:p>
@@ -1707,10 +1698,9 @@
           <a:lstStyle/>
           <a:p>
             <a:r>
-              <a:rPr lang="en-US" smtClean="0"/>
+              <a:rPr lang="en-US"/>
               <a:t>Click to edit Master title style</a:t>
             </a:r>
-            <a:endParaRPr lang="en-US"/>
           </a:p>
         </p:txBody>
       </p:sp>
@@ -1764,38 +1754,37 @@
           <a:p>
             <a:pPr lvl="0"/>
             <a:r>
-              <a:rPr lang="en-US" smtClean="0"/>
+              <a:rPr lang="en-US"/>
               <a:t>Click to edit Master text styles</a:t>
             </a:r>
           </a:p>
           <a:p>
             <a:pPr lvl="1"/>
             <a:r>
-              <a:rPr lang="en-US" smtClean="0"/>
+              <a:rPr lang="en-US"/>
               <a:t>Second level</a:t>
             </a:r>
           </a:p>
           <a:p>
             <a:pPr lvl="2"/>
             <a:r>
-              <a:rPr lang="en-US" smtClean="0"/>
+              <a:rPr lang="en-US"/>
               <a:t>Third level</a:t>
             </a:r>
           </a:p>
           <a:p>
             <a:pPr lvl="3"/>
             <a:r>
-              <a:rPr lang="en-US" smtClean="0"/>
+              <a:rPr lang="en-US"/>
               <a:t>Fourth level</a:t>
             </a:r>
           </a:p>
           <a:p>
             <a:pPr lvl="4"/>
             <a:r>
-              <a:rPr lang="en-US" smtClean="0"/>
+              <a:rPr lang="en-US"/>
               <a:t>Fifth level</a:t>
             </a:r>
-            <a:endParaRPr lang="en-US"/>
           </a:p>
         </p:txBody>
       </p:sp>
@@ -1849,38 +1838,37 @@
           <a:p>
             <a:pPr lvl="0"/>
             <a:r>
-              <a:rPr lang="en-US" smtClean="0"/>
+              <a:rPr lang="en-US"/>
               <a:t>Click to edit Master text styles</a:t>
             </a:r>
           </a:p>
           <a:p>
             <a:pPr lvl="1"/>
             <a:r>
-              <a:rPr lang="en-US" smtClean="0"/>
+              <a:rPr lang="en-US"/>
               <a:t>Second level</a:t>
             </a:r>
           </a:p>
           <a:p>
             <a:pPr lvl="2"/>
             <a:r>
-              <a:rPr lang="en-US" smtClean="0"/>
+              <a:rPr lang="en-US"/>
               <a:t>Third level</a:t>
             </a:r>
           </a:p>
           <a:p>
             <a:pPr lvl="3"/>
             <a:r>
-              <a:rPr lang="en-US" smtClean="0"/>
+              <a:rPr lang="en-US"/>
               <a:t>Fourth level</a:t>
             </a:r>
           </a:p>
           <a:p>
             <a:pPr lvl="4"/>
             <a:r>
-              <a:rPr lang="en-US" smtClean="0"/>
+              <a:rPr lang="en-US"/>
               <a:t>Fifth level</a:t>
             </a:r>
-            <a:endParaRPr lang="en-US"/>
           </a:p>
         </p:txBody>
       </p:sp>
@@ -1902,7 +1890,7 @@
             <a:fld id="{E3D07B0C-BD95-41BE-BB3E-AC75822DF381}" type="datetimeFigureOut">
               <a:rPr lang="en-US" smtClean="0"/>
               <a:pPr/>
-              <a:t>6/18/2015</a:t>
+              <a:t>4/28/2021</a:t>
             </a:fld>
             <a:endParaRPr lang="en-US"/>
           </a:p>
@@ -2001,10 +1989,9 @@
           </a:lstStyle>
           <a:p>
             <a:r>
-              <a:rPr lang="en-US" smtClean="0"/>
+              <a:rPr lang="en-US"/>
               <a:t>Click to edit Master title style</a:t>
             </a:r>
-            <a:endParaRPr lang="en-US"/>
           </a:p>
         </p:txBody>
       </p:sp>
@@ -2067,7 +2054,7 @@
           <a:p>
             <a:pPr lvl="0"/>
             <a:r>
-              <a:rPr lang="en-US" smtClean="0"/>
+              <a:rPr lang="en-US"/>
               <a:t>Click to edit Master text styles</a:t>
             </a:r>
           </a:p>
@@ -2123,38 +2110,37 @@
           <a:p>
             <a:pPr lvl="0"/>
             <a:r>
-              <a:rPr lang="en-US" smtClean="0"/>
+              <a:rPr lang="en-US"/>
               <a:t>Click to edit Master text styles</a:t>
             </a:r>
           </a:p>
           <a:p>
             <a:pPr lvl="1"/>
             <a:r>
-              <a:rPr lang="en-US" smtClean="0"/>
+              <a:rPr lang="en-US"/>
               <a:t>Second level</a:t>
             </a:r>
           </a:p>
           <a:p>
             <a:pPr lvl="2"/>
             <a:r>
-              <a:rPr lang="en-US" smtClean="0"/>
+              <a:rPr lang="en-US"/>
               <a:t>Third level</a:t>
             </a:r>
           </a:p>
           <a:p>
             <a:pPr lvl="3"/>
             <a:r>
-              <a:rPr lang="en-US" smtClean="0"/>
+              <a:rPr lang="en-US"/>
               <a:t>Fourth level</a:t>
             </a:r>
           </a:p>
           <a:p>
             <a:pPr lvl="4"/>
             <a:r>
-              <a:rPr lang="en-US" smtClean="0"/>
+              <a:rPr lang="en-US"/>
               <a:t>Fifth level</a:t>
             </a:r>
-            <a:endParaRPr lang="en-US"/>
           </a:p>
         </p:txBody>
       </p:sp>
@@ -2217,7 +2203,7 @@
           <a:p>
             <a:pPr lvl="0"/>
             <a:r>
-              <a:rPr lang="en-US" smtClean="0"/>
+              <a:rPr lang="en-US"/>
               <a:t>Click to edit Master text styles</a:t>
             </a:r>
           </a:p>
@@ -2273,38 +2259,37 @@
           <a:p>
             <a:pPr lvl="0"/>
             <a:r>
-              <a:rPr lang="en-US" smtClean="0"/>
+              <a:rPr lang="en-US"/>
               <a:t>Click to edit Master text styles</a:t>
             </a:r>
           </a:p>
           <a:p>
             <a:pPr lvl="1"/>
             <a:r>
-              <a:rPr lang="en-US" smtClean="0"/>
+              <a:rPr lang="en-US"/>
               <a:t>Second level</a:t>
             </a:r>
           </a:p>
           <a:p>
             <a:pPr lvl="2"/>
             <a:r>
-              <a:rPr lang="en-US" smtClean="0"/>
+              <a:rPr lang="en-US"/>
               <a:t>Third level</a:t>
             </a:r>
           </a:p>
           <a:p>
             <a:pPr lvl="3"/>
             <a:r>
-              <a:rPr lang="en-US" smtClean="0"/>
+              <a:rPr lang="en-US"/>
               <a:t>Fourth level</a:t>
             </a:r>
           </a:p>
           <a:p>
             <a:pPr lvl="4"/>
             <a:r>
-              <a:rPr lang="en-US" smtClean="0"/>
+              <a:rPr lang="en-US"/>
               <a:t>Fifth level</a:t>
             </a:r>
-            <a:endParaRPr lang="en-US"/>
           </a:p>
         </p:txBody>
       </p:sp>
@@ -2326,7 +2311,7 @@
             <a:fld id="{E3D07B0C-BD95-41BE-BB3E-AC75822DF381}" type="datetimeFigureOut">
               <a:rPr lang="en-US" smtClean="0"/>
               <a:pPr/>
-              <a:t>6/18/2015</a:t>
+              <a:t>4/28/2021</a:t>
             </a:fld>
             <a:endParaRPr lang="en-US"/>
           </a:p>
@@ -2421,10 +2406,9 @@
           <a:lstStyle/>
           <a:p>
             <a:r>
-              <a:rPr lang="en-US" smtClean="0"/>
+              <a:rPr lang="en-US"/>
               <a:t>Click to edit Master title style</a:t>
             </a:r>
-            <a:endParaRPr lang="en-US"/>
           </a:p>
         </p:txBody>
       </p:sp>
@@ -2446,7 +2430,7 @@
             <a:fld id="{E3D07B0C-BD95-41BE-BB3E-AC75822DF381}" type="datetimeFigureOut">
               <a:rPr lang="en-US" smtClean="0"/>
               <a:pPr/>
-              <a:t>6/18/2015</a:t>
+              <a:t>4/28/2021</a:t>
             </a:fld>
             <a:endParaRPr lang="en-US"/>
           </a:p>
@@ -2543,7 +2527,7 @@
             <a:fld id="{E3D07B0C-BD95-41BE-BB3E-AC75822DF381}" type="datetimeFigureOut">
               <a:rPr lang="en-US" smtClean="0"/>
               <a:pPr/>
-              <a:t>6/18/2015</a:t>
+              <a:t>4/28/2021</a:t>
             </a:fld>
             <a:endParaRPr lang="en-US"/>
           </a:p>
@@ -2647,10 +2631,9 @@
           </a:lstStyle>
           <a:p>
             <a:r>
-              <a:rPr lang="en-US" smtClean="0"/>
+              <a:rPr lang="en-US"/>
               <a:t>Click to edit Master title style</a:t>
             </a:r>
-            <a:endParaRPr lang="en-US"/>
           </a:p>
         </p:txBody>
       </p:sp>
@@ -2704,38 +2687,37 @@
           <a:p>
             <a:pPr lvl="0"/>
             <a:r>
-              <a:rPr lang="en-US" smtClean="0"/>
+              <a:rPr lang="en-US"/>
               <a:t>Click to edit Master text styles</a:t>
             </a:r>
           </a:p>
           <a:p>
             <a:pPr lvl="1"/>
             <a:r>
-              <a:rPr lang="en-US" smtClean="0"/>
+              <a:rPr lang="en-US"/>
               <a:t>Second level</a:t>
             </a:r>
           </a:p>
           <a:p>
             <a:pPr lvl="2"/>
             <a:r>
-              <a:rPr lang="en-US" smtClean="0"/>
+              <a:rPr lang="en-US"/>
               <a:t>Third level</a:t>
             </a:r>
           </a:p>
           <a:p>
             <a:pPr lvl="3"/>
             <a:r>
-              <a:rPr lang="en-US" smtClean="0"/>
+              <a:rPr lang="en-US"/>
               <a:t>Fourth level</a:t>
             </a:r>
           </a:p>
           <a:p>
             <a:pPr lvl="4"/>
             <a:r>
-              <a:rPr lang="en-US" smtClean="0"/>
+              <a:rPr lang="en-US"/>
               <a:t>Fifth level</a:t>
             </a:r>
-            <a:endParaRPr lang="en-US"/>
           </a:p>
         </p:txBody>
       </p:sp>
@@ -2798,7 +2780,7 @@
           <a:p>
             <a:pPr lvl="0"/>
             <a:r>
-              <a:rPr lang="en-US" smtClean="0"/>
+              <a:rPr lang="en-US"/>
               <a:t>Click to edit Master text styles</a:t>
             </a:r>
           </a:p>
@@ -2822,7 +2804,7 @@
             <a:fld id="{E3D07B0C-BD95-41BE-BB3E-AC75822DF381}" type="datetimeFigureOut">
               <a:rPr lang="en-US" smtClean="0"/>
               <a:pPr/>
-              <a:t>6/18/2015</a:t>
+              <a:t>4/28/2021</a:t>
             </a:fld>
             <a:endParaRPr lang="en-US"/>
           </a:p>
@@ -2926,10 +2908,9 @@
           </a:lstStyle>
           <a:p>
             <a:r>
-              <a:rPr lang="en-US" smtClean="0"/>
+              <a:rPr lang="en-US"/>
               <a:t>Click to edit Master title style</a:t>
             </a:r>
-            <a:endParaRPr lang="en-US"/>
           </a:p>
         </p:txBody>
       </p:sp>
@@ -3053,7 +3034,7 @@
           <a:p>
             <a:pPr lvl="0"/>
             <a:r>
-              <a:rPr lang="en-US" smtClean="0"/>
+              <a:rPr lang="en-US"/>
               <a:t>Click to edit Master text styles</a:t>
             </a:r>
           </a:p>
@@ -3077,7 +3058,7 @@
             <a:fld id="{E3D07B0C-BD95-41BE-BB3E-AC75822DF381}" type="datetimeFigureOut">
               <a:rPr lang="en-US" smtClean="0"/>
               <a:pPr/>
-              <a:t>6/18/2015</a:t>
+              <a:t>4/28/2021</a:t>
             </a:fld>
             <a:endParaRPr lang="en-US"/>
           </a:p>
@@ -3187,10 +3168,9 @@
           <a:lstStyle/>
           <a:p>
             <a:r>
-              <a:rPr lang="en-US" smtClean="0"/>
+              <a:rPr lang="en-US"/>
               <a:t>Click to edit Master title style</a:t>
             </a:r>
-            <a:endParaRPr lang="en-US"/>
           </a:p>
         </p:txBody>
       </p:sp>
@@ -3221,38 +3201,37 @@
           <a:p>
             <a:pPr lvl="0"/>
             <a:r>
-              <a:rPr lang="en-US" smtClean="0"/>
+              <a:rPr lang="en-US"/>
               <a:t>Click to edit Master text styles</a:t>
             </a:r>
           </a:p>
           <a:p>
             <a:pPr lvl="1"/>
             <a:r>
-              <a:rPr lang="en-US" smtClean="0"/>
+              <a:rPr lang="en-US"/>
               <a:t>Second level</a:t>
             </a:r>
           </a:p>
           <a:p>
             <a:pPr lvl="2"/>
             <a:r>
-              <a:rPr lang="en-US" smtClean="0"/>
+              <a:rPr lang="en-US"/>
               <a:t>Third level</a:t>
             </a:r>
           </a:p>
           <a:p>
             <a:pPr lvl="3"/>
             <a:r>
-              <a:rPr lang="en-US" smtClean="0"/>
+              <a:rPr lang="en-US"/>
               <a:t>Fourth level</a:t>
             </a:r>
           </a:p>
           <a:p>
             <a:pPr lvl="4"/>
             <a:r>
-              <a:rPr lang="en-US" smtClean="0"/>
+              <a:rPr lang="en-US"/>
               <a:t>Fifth level</a:t>
             </a:r>
-            <a:endParaRPr lang="en-US"/>
           </a:p>
         </p:txBody>
       </p:sp>
@@ -3292,7 +3271,7 @@
             <a:fld id="{E3D07B0C-BD95-41BE-BB3E-AC75822DF381}" type="datetimeFigureOut">
               <a:rPr lang="en-US" smtClean="0"/>
               <a:pPr/>
-              <a:t>6/18/2015</a:t>
+              <a:t>4/28/2021</a:t>
             </a:fld>
             <a:endParaRPr lang="en-US"/>
           </a:p>
@@ -3720,8 +3699,8 @@
         </p:nvSpPr>
         <p:spPr>
           <a:xfrm>
-            <a:off x="3351825" y="1411716"/>
-            <a:ext cx="1541418" cy="215444"/>
+            <a:off x="3161324" y="1412204"/>
+            <a:ext cx="1677375" cy="215444"/>
           </a:xfrm>
           <a:prstGeom prst="rect">
             <a:avLst/>
@@ -3735,11 +3714,15 @@
           <a:lstStyle/>
           <a:p>
             <a:r>
-              <a:rPr lang="en-US" altLang="zh-TW" sz="800" dirty="0" err="1" smtClean="0"/>
-              <a:t>Camera.setupViewProjection</a:t>
+              <a:rPr lang="en-US" altLang="zh-TW" sz="800" dirty="0"/>
+              <a:t>Camera. </a:t>
             </a:r>
             <a:r>
-              <a:rPr lang="en-US" altLang="zh-TW" sz="800" dirty="0" smtClean="0"/>
+              <a:rPr lang="en-US" altLang="zh-TW" sz="800" dirty="0" err="1"/>
+              <a:t>setViewAndCameraMatrix</a:t>
+            </a:r>
+            <a:r>
+              <a:rPr lang="en-US" altLang="zh-TW" sz="800" dirty="0"/>
               <a:t>()</a:t>
             </a:r>
             <a:endParaRPr lang="zh-TW" altLang="en-US" sz="800" dirty="0"/>
@@ -3769,7 +3752,7 @@
           <a:lstStyle/>
           <a:p>
             <a:r>
-              <a:rPr lang="en-US" altLang="zh-TW" sz="800" dirty="0" smtClean="0"/>
+              <a:rPr lang="en-US" altLang="zh-TW" sz="800" dirty="0"/>
               <a:t>WC window</a:t>
             </a:r>
             <a:endParaRPr lang="zh-TW" altLang="en-US" sz="800" dirty="0"/>
@@ -3799,7 +3782,7 @@
           <a:lstStyle/>
           <a:p>
             <a:r>
-              <a:rPr lang="en-US" altLang="zh-TW" sz="800" dirty="0" smtClean="0"/>
+              <a:rPr lang="en-US" altLang="zh-TW" sz="800" dirty="0"/>
               <a:t>WC center</a:t>
             </a:r>
             <a:endParaRPr lang="zh-TW" altLang="en-US" sz="800" dirty="0"/>
@@ -3906,7 +3889,7 @@
           <a:lstStyle/>
           <a:p>
             <a:r>
-              <a:rPr lang="en-US" altLang="zh-TW" sz="800" dirty="0" err="1" smtClean="0">
+              <a:rPr lang="en-US" altLang="zh-TW" sz="800" dirty="0" err="1">
                 <a:solidFill>
                   <a:schemeClr val="bg1"/>
                 </a:solidFill>
@@ -3914,7 +3897,7 @@
               <a:t>H</a:t>
             </a:r>
             <a:r>
-              <a:rPr lang="en-US" altLang="zh-TW" sz="800" baseline="-25000" dirty="0" err="1" smtClean="0">
+              <a:rPr lang="en-US" altLang="zh-TW" sz="800" baseline="-25000" dirty="0" err="1">
                 <a:solidFill>
                   <a:schemeClr val="bg1"/>
                 </a:solidFill>
@@ -3952,7 +3935,7 @@
           <a:lstStyle/>
           <a:p>
             <a:r>
-              <a:rPr lang="en-US" altLang="zh-TW" sz="800" dirty="0" err="1" smtClean="0">
+              <a:rPr lang="en-US" altLang="zh-TW" sz="800" dirty="0" err="1">
                 <a:solidFill>
                   <a:schemeClr val="bg1"/>
                 </a:solidFill>
@@ -3960,7 +3943,7 @@
               <a:t>W</a:t>
             </a:r>
             <a:r>
-              <a:rPr lang="en-US" altLang="zh-TW" sz="800" baseline="-25000" dirty="0" err="1" smtClean="0">
+              <a:rPr lang="en-US" altLang="zh-TW" sz="800" baseline="-25000" dirty="0" err="1">
                 <a:solidFill>
                   <a:schemeClr val="bg1"/>
                 </a:solidFill>
@@ -4136,27 +4119,27 @@
             <a:lstStyle/>
             <a:p>
               <a:r>
-                <a:rPr lang="en-US" altLang="zh-TW" sz="800" dirty="0" smtClean="0"/>
+                <a:rPr lang="en-US" altLang="zh-TW" sz="800" dirty="0"/>
                 <a:t>(</a:t>
               </a:r>
               <a:r>
-                <a:rPr lang="en-US" altLang="zh-TW" sz="800" dirty="0" err="1" smtClean="0"/>
+                <a:rPr lang="en-US" altLang="zh-TW" sz="800" dirty="0" err="1"/>
                 <a:t>V</a:t>
               </a:r>
               <a:r>
-                <a:rPr lang="en-US" altLang="zh-TW" sz="800" baseline="-25000" dirty="0" err="1" smtClean="0"/>
+                <a:rPr lang="en-US" altLang="zh-TW" sz="800" baseline="-25000" dirty="0" err="1"/>
                 <a:t>x</a:t>
               </a:r>
               <a:r>
-                <a:rPr lang="en-US" altLang="zh-TW" sz="800" dirty="0" err="1" smtClean="0"/>
+                <a:rPr lang="en-US" altLang="zh-TW" sz="800" dirty="0" err="1"/>
                 <a:t>,V</a:t>
               </a:r>
               <a:r>
-                <a:rPr lang="en-US" altLang="zh-TW" sz="800" baseline="-25000" dirty="0" err="1" smtClean="0"/>
+                <a:rPr lang="en-US" altLang="zh-TW" sz="800" baseline="-25000" dirty="0" err="1"/>
                 <a:t>y</a:t>
               </a:r>
               <a:r>
-                <a:rPr lang="en-US" altLang="zh-TW" sz="800" dirty="0" smtClean="0"/>
+                <a:rPr lang="en-US" altLang="zh-TW" sz="800" dirty="0"/>
                 <a:t>)</a:t>
               </a:r>
               <a:endParaRPr lang="zh-TW" altLang="en-US" sz="800" baseline="-25000" dirty="0"/>
@@ -4186,7 +4169,7 @@
             <a:lstStyle/>
             <a:p>
               <a:r>
-                <a:rPr lang="en-US" altLang="zh-TW" sz="800" dirty="0" smtClean="0"/>
+                <a:rPr lang="en-US" altLang="zh-TW" sz="800" dirty="0"/>
                 <a:t>Viewport bounds</a:t>
               </a:r>
               <a:endParaRPr lang="zh-TW" altLang="en-US" sz="800" dirty="0"/>
@@ -4216,7 +4199,7 @@
             <a:lstStyle/>
             <a:p>
               <a:r>
-                <a:rPr lang="en-US" altLang="zh-TW" sz="800" dirty="0" smtClean="0"/>
+                <a:rPr lang="en-US" altLang="zh-TW" sz="800" dirty="0"/>
                 <a:t>HTML canvas bounds</a:t>
               </a:r>
               <a:endParaRPr lang="zh-TW" altLang="en-US" sz="800" dirty="0"/>
@@ -4287,7 +4270,7 @@
             <a:lstStyle/>
             <a:p>
               <a:r>
-                <a:rPr lang="en-US" altLang="zh-TW" sz="800" dirty="0" err="1" smtClean="0">
+                <a:rPr lang="en-US" altLang="zh-TW" sz="800" dirty="0" err="1">
                   <a:solidFill>
                     <a:schemeClr val="bg1"/>
                   </a:solidFill>
@@ -4295,7 +4278,7 @@
                 <a:t>H</a:t>
               </a:r>
               <a:r>
-                <a:rPr lang="en-US" altLang="zh-TW" sz="800" baseline="-25000" dirty="0" err="1" smtClean="0">
+                <a:rPr lang="en-US" altLang="zh-TW" sz="800" baseline="-25000" dirty="0" err="1">
                   <a:solidFill>
                     <a:schemeClr val="bg1"/>
                   </a:solidFill>
@@ -4333,7 +4316,7 @@
             <a:lstStyle/>
             <a:p>
               <a:r>
-                <a:rPr lang="en-US" altLang="zh-TW" sz="800" dirty="0" err="1" smtClean="0">
+                <a:rPr lang="en-US" altLang="zh-TW" sz="800" dirty="0" err="1">
                   <a:solidFill>
                     <a:schemeClr val="bg1"/>
                   </a:solidFill>
@@ -4946,7 +4929,7 @@
           <a:lstStyle/>
           <a:p>
             <a:r>
-              <a:rPr lang="en-US" altLang="zh-TW" sz="800" dirty="0" smtClean="0"/>
+              <a:rPr lang="en-US" altLang="zh-TW" sz="800" dirty="0"/>
               <a:t>WC center</a:t>
             </a:r>
             <a:endParaRPr lang="zh-TW" altLang="en-US" sz="800" dirty="0"/>
@@ -5016,7 +4999,7 @@
           <a:lstStyle/>
           <a:p>
             <a:r>
-              <a:rPr lang="en-US" altLang="zh-TW" sz="800" dirty="0" smtClean="0"/>
+              <a:rPr lang="en-US" altLang="zh-TW" sz="800" dirty="0"/>
               <a:t>Zoom to ½ of original size</a:t>
             </a:r>
             <a:endParaRPr lang="zh-TW" altLang="en-US" sz="800" dirty="0"/>
@@ -5343,7 +5326,7 @@
           <a:lstStyle/>
           <a:p>
             <a:r>
-              <a:rPr lang="en-US" altLang="zh-TW" sz="800" dirty="0" smtClean="0">
+              <a:rPr lang="en-US" altLang="zh-TW" sz="800" dirty="0">
                 <a:solidFill>
                   <a:schemeClr val="bg1"/>
                 </a:solidFill>
@@ -5381,7 +5364,7 @@
           <a:lstStyle/>
           <a:p>
             <a:r>
-              <a:rPr lang="en-US" altLang="zh-TW" sz="800" dirty="0" smtClean="0">
+              <a:rPr lang="en-US" altLang="zh-TW" sz="800" dirty="0">
                 <a:solidFill>
                   <a:schemeClr val="bg1"/>
                 </a:solidFill>
@@ -5419,7 +5402,7 @@
           <a:lstStyle/>
           <a:p>
             <a:r>
-              <a:rPr lang="en-US" altLang="zh-TW" sz="800" dirty="0" smtClean="0"/>
+              <a:rPr lang="en-US" altLang="zh-TW" sz="800" dirty="0"/>
               <a:t>Original WC center</a:t>
             </a:r>
             <a:endParaRPr lang="zh-TW" altLang="en-US" sz="800" dirty="0"/>
@@ -5487,7 +5470,7 @@
           <a:lstStyle/>
           <a:p>
             <a:r>
-              <a:rPr lang="en-US" altLang="zh-TW" sz="800" dirty="0" smtClean="0"/>
+              <a:rPr lang="en-US" altLang="zh-TW" sz="800" dirty="0"/>
               <a:t>New WC center</a:t>
             </a:r>
             <a:endParaRPr lang="zh-TW" altLang="en-US" sz="800" dirty="0"/>
@@ -5544,13 +5527,6 @@
   <p:clrMapOvr>
     <a:masterClrMapping/>
   </p:clrMapOvr>
-  <p:timing>
-    <p:tnLst>
-      <p:par>
-        <p:cTn id="1" dur="indefinite" restart="never" nodeType="tmRoot"/>
-      </p:par>
-    </p:tnLst>
-  </p:timing>
 </p:sld>
 </file>
 
@@ -5670,20 +5646,8 @@
           <a:lstStyle/>
           <a:p>
             <a:r>
-              <a:rPr lang="en-US" altLang="zh-TW" sz="800" dirty="0" smtClean="0"/>
-              <a:t>Intermediate results from </a:t>
-            </a:r>
-            <a:r>
-              <a:rPr lang="en-US" altLang="zh-TW" sz="800" dirty="0" smtClean="0"/>
-              <a:t>linear </a:t>
-            </a:r>
-            <a:r>
               <a:rPr lang="en-US" altLang="zh-TW" sz="800" dirty="0"/>
-              <a:t>i</a:t>
-            </a:r>
-            <a:r>
-              <a:rPr lang="en-US" altLang="zh-TW" sz="800" dirty="0" smtClean="0"/>
-              <a:t>nterpolation</a:t>
+              <a:t>Intermediate results from linear interpolation</a:t>
             </a:r>
             <a:endParaRPr lang="zh-TW" altLang="en-US" sz="800" dirty="0"/>
           </a:p>
@@ -5712,7 +5676,7 @@
           <a:lstStyle/>
           <a:p>
             <a:r>
-              <a:rPr lang="en-US" altLang="zh-TW" sz="800" dirty="0" smtClean="0"/>
+              <a:rPr lang="en-US" altLang="zh-TW" sz="800" dirty="0"/>
               <a:t>Intermediate results from interpolation based on an exponential function</a:t>
             </a:r>
             <a:endParaRPr lang="zh-TW" altLang="en-US" sz="800" dirty="0"/>
@@ -6868,7 +6832,7 @@
             <a:lstStyle/>
             <a:p>
               <a:r>
-                <a:rPr lang="en-US" altLang="zh-TW" sz="800" dirty="0" smtClean="0"/>
+                <a:rPr lang="en-US" altLang="zh-TW" sz="800" dirty="0"/>
                 <a:t>Value</a:t>
               </a:r>
               <a:endParaRPr lang="zh-TW" altLang="en-US" sz="800" dirty="0"/>
@@ -6898,7 +6862,7 @@
             <a:lstStyle/>
             <a:p>
               <a:r>
-                <a:rPr lang="en-US" altLang="zh-TW" sz="800" dirty="0" smtClean="0"/>
+                <a:rPr lang="en-US" altLang="zh-TW" sz="800" dirty="0"/>
                 <a:t>New Value</a:t>
               </a:r>
               <a:endParaRPr lang="zh-TW" altLang="en-US" sz="800" dirty="0"/>
@@ -6928,7 +6892,7 @@
             <a:lstStyle/>
             <a:p>
               <a:r>
-                <a:rPr lang="en-US" altLang="zh-TW" sz="800" dirty="0" smtClean="0"/>
+                <a:rPr lang="en-US" altLang="zh-TW" sz="800" dirty="0"/>
                 <a:t>Time</a:t>
               </a:r>
               <a:endParaRPr lang="zh-TW" altLang="en-US" sz="800" dirty="0"/>
@@ -6958,11 +6922,11 @@
             <a:lstStyle/>
             <a:p>
               <a:r>
-                <a:rPr lang="en-US" altLang="zh-TW" sz="800" dirty="0" smtClean="0"/>
+                <a:rPr lang="en-US" altLang="zh-TW" sz="800" dirty="0"/>
                 <a:t>t</a:t>
               </a:r>
               <a:r>
-                <a:rPr lang="en-US" altLang="zh-TW" sz="800" baseline="-25000" dirty="0" smtClean="0"/>
+                <a:rPr lang="en-US" altLang="zh-TW" sz="800" baseline="-25000" dirty="0"/>
                 <a:t>1</a:t>
               </a:r>
               <a:endParaRPr lang="zh-TW" altLang="en-US" sz="800" baseline="-25000" dirty="0"/>
@@ -6992,11 +6956,11 @@
             <a:lstStyle/>
             <a:p>
               <a:r>
-                <a:rPr lang="en-US" altLang="zh-TW" sz="800" dirty="0" smtClean="0"/>
+                <a:rPr lang="en-US" altLang="zh-TW" sz="800" dirty="0"/>
                 <a:t>t</a:t>
               </a:r>
               <a:r>
-                <a:rPr lang="en-US" altLang="zh-TW" sz="800" baseline="-25000" dirty="0" smtClean="0"/>
+                <a:rPr lang="en-US" altLang="zh-TW" sz="800" baseline="-25000" dirty="0"/>
                 <a:t>2</a:t>
               </a:r>
               <a:endParaRPr lang="zh-TW" altLang="en-US" sz="800" baseline="-25000" dirty="0"/>
@@ -7026,7 +6990,7 @@
             <a:lstStyle/>
             <a:p>
               <a:r>
-                <a:rPr lang="en-US" altLang="zh-TW" sz="800" dirty="0" smtClean="0"/>
+                <a:rPr lang="en-US" altLang="zh-TW" sz="800" dirty="0"/>
                 <a:t>Old Value</a:t>
               </a:r>
               <a:endParaRPr lang="zh-TW" altLang="en-US" sz="800" dirty="0"/>
@@ -7940,7 +7904,7 @@
               <a:lstStyle/>
               <a:p>
                 <a:r>
-                  <a:rPr lang="en-US" altLang="zh-TW" sz="800" dirty="0" smtClean="0"/>
+                  <a:rPr lang="en-US" altLang="zh-TW" sz="800" dirty="0"/>
                   <a:t>Damping function e.g. </a:t>
                 </a:r>
                 <a14:m>
@@ -7973,7 +7937,7 @@
                   </m:oMath>
                 </a14:m>
                 <a:r>
-                  <a:rPr lang="en-US" altLang="zh-TW" sz="800" dirty="0" smtClean="0"/>
+                  <a:rPr lang="en-US" altLang="zh-TW" sz="800" dirty="0"/>
                   <a:t> </a:t>
                 </a:r>
                 <a:endParaRPr lang="zh-TW" altLang="en-US" sz="800" dirty="0"/>
@@ -8081,11 +8045,11 @@
           <a:lstStyle/>
           <a:p>
             <a:r>
-              <a:rPr lang="en-US" altLang="zh-TW" sz="800" dirty="0" smtClean="0"/>
+              <a:rPr lang="en-US" altLang="zh-TW" sz="800" dirty="0"/>
               <a:t>k</a:t>
             </a:r>
             <a:r>
-              <a:rPr lang="en-US" altLang="zh-TW" sz="800" baseline="-25000" dirty="0" smtClean="0"/>
+              <a:rPr lang="en-US" altLang="zh-TW" sz="800" baseline="-25000" dirty="0"/>
               <a:t>1</a:t>
             </a:r>
             <a:endParaRPr lang="zh-TW" altLang="en-US" sz="800" baseline="-25000" dirty="0"/>
@@ -8421,7 +8385,7 @@
               <a:lstStyle/>
               <a:p>
                 <a:r>
-                  <a:rPr lang="en-US" altLang="zh-TW" sz="800" dirty="0" smtClean="0"/>
+                  <a:rPr lang="en-US" altLang="zh-TW" sz="800" dirty="0"/>
                   <a:t>Damped Simple Harmonic motion e.g. </a:t>
                 </a:r>
                 <a14:m>
@@ -8555,7 +8519,7 @@
                   </m:oMath>
                 </a14:m>
                 <a:r>
-                  <a:rPr lang="en-US" altLang="zh-TW" sz="800" dirty="0" smtClean="0"/>
+                  <a:rPr lang="en-US" altLang="zh-TW" sz="800" dirty="0"/>
                   <a:t> </a:t>
                 </a:r>
                 <a:endParaRPr lang="zh-TW" altLang="en-US" sz="800" dirty="0"/>
@@ -8627,7 +8591,7 @@
               <a:lstStyle/>
               <a:p>
                 <a:r>
-                  <a:rPr lang="en-US" altLang="zh-TW" sz="800" dirty="0" smtClean="0"/>
+                  <a:rPr lang="en-US" altLang="zh-TW" sz="800" dirty="0"/>
                   <a:t>Oscillation function e.g. </a:t>
                 </a:r>
                 <a14:m>
@@ -8772,7 +8736,7 @@
           <a:lstStyle/>
           <a:p>
             <a:r>
-              <a:rPr lang="en-US" altLang="zh-TW" sz="800" dirty="0" smtClean="0"/>
+              <a:rPr lang="en-US" altLang="zh-TW" sz="800" dirty="0"/>
               <a:t>Time</a:t>
             </a:r>
             <a:endParaRPr lang="zh-TW" altLang="en-US" sz="800" dirty="0"/>
@@ -8802,7 +8766,7 @@
           <a:lstStyle/>
           <a:p>
             <a:r>
-              <a:rPr lang="en-US" altLang="zh-TW" sz="800" dirty="0" smtClean="0"/>
+              <a:rPr lang="en-US" altLang="zh-TW" sz="800" dirty="0"/>
               <a:t>Value</a:t>
             </a:r>
             <a:endParaRPr lang="zh-TW" altLang="en-US" sz="800" dirty="0"/>
@@ -10220,7 +10184,7 @@
                   </m:oMath>
                 </a14:m>
                 <a:r>
-                  <a:rPr lang="en-US" altLang="zh-TW" sz="800" dirty="0" smtClean="0"/>
+                  <a:rPr lang="en-US" altLang="zh-TW" sz="800" dirty="0"/>
                   <a:t> </a:t>
                 </a:r>
                 <a:endParaRPr lang="zh-TW" altLang="en-US" sz="800" dirty="0"/>
@@ -10290,7 +10254,7 @@
           <a:lstStyle/>
           <a:p>
             <a:r>
-              <a:rPr lang="en-US" altLang="zh-TW" sz="800" dirty="0" smtClean="0"/>
+              <a:rPr lang="en-US" altLang="zh-TW" sz="800" dirty="0"/>
               <a:t>Time</a:t>
             </a:r>
             <a:endParaRPr lang="zh-TW" altLang="en-US" sz="800" dirty="0"/>
@@ -10320,7 +10284,7 @@
           <a:lstStyle/>
           <a:p>
             <a:r>
-              <a:rPr lang="en-US" altLang="zh-TW" sz="800" dirty="0" smtClean="0"/>
+              <a:rPr lang="en-US" altLang="zh-TW" sz="800" dirty="0"/>
               <a:t>Value</a:t>
             </a:r>
             <a:endParaRPr lang="zh-TW" altLang="en-US" sz="800" dirty="0"/>
@@ -11264,8 +11228,8 @@
           </p:sp>
         </mc:Fallback>
       </mc:AlternateContent>
-      <mc:AlternateContent xmlns:mc="http://schemas.openxmlformats.org/markup-compatibility/2006" xmlns:a14="http://schemas.microsoft.com/office/drawing/2010/main">
-        <mc:Choice Requires="a14">
+      <mc:AlternateContent xmlns:mc="http://schemas.openxmlformats.org/markup-compatibility/2006">
+        <mc:Choice xmlns:a14="http://schemas.microsoft.com/office/drawing/2010/main" Requires="a14">
           <p:sp>
             <p:nvSpPr>
               <p:cNvPr id="87" name="TextBox 86"/>
@@ -11275,7 +11239,7 @@
             <p:spPr>
               <a:xfrm>
                 <a:off x="3003600" y="2799278"/>
-                <a:ext cx="1128963" cy="393313"/>
+                <a:ext cx="1024961" cy="393313"/>
               </a:xfrm>
               <a:prstGeom prst="rect">
                 <a:avLst/>
@@ -11392,24 +11356,11 @@
                             </m:dPr>
                             <m:e>
                               <m:r>
-                                <a:rPr lang="en-US" sz="800" b="0" i="1" smtClean="0">
-                                  <a:latin typeface="Cambria Math"/>
-                                </a:rPr>
-                                <m:t>2</m:t>
-                              </m:r>
-                              <m:r>
-                                <a:rPr lang="en-US" sz="800" b="0" i="1" smtClean="0">
-                                  <a:latin typeface="Cambria Math"/>
-                                  <a:ea typeface="Cambria Math"/>
-                                </a:rPr>
-                                <m:t>𝜋</m:t>
-                              </m:r>
-                              <m:r>
-                                <a:rPr lang="en-US" sz="800" b="0" i="1" smtClean="0">
-                                  <a:latin typeface="Cambria Math"/>
-                                  <a:ea typeface="Cambria Math"/>
-                                </a:rPr>
-                                <m:t>𝑓</m:t>
+                                <m:rPr>
+                                  <m:nor/>
+                                </m:rPr>
+                                <a:rPr lang="en-US" altLang="zh-TW" sz="800" dirty="0"/>
+                                <m:t>ω</m:t>
                               </m:r>
                               <m:f>
                                 <m:fPr>
@@ -11448,7 +11399,7 @@
             </p:txBody>
           </p:sp>
         </mc:Choice>
-        <mc:Fallback xmlns="">
+        <mc:Fallback>
           <p:sp>
             <p:nvSpPr>
               <p:cNvPr id="87" name="TextBox 86"/>
@@ -11460,13 +11411,13 @@
             <p:spPr>
               <a:xfrm>
                 <a:off x="3003600" y="2799278"/>
-                <a:ext cx="1128963" cy="393313"/>
+                <a:ext cx="1024961" cy="393313"/>
               </a:xfrm>
               <a:prstGeom prst="rect">
                 <a:avLst/>
               </a:prstGeom>
-              <a:blipFill rotWithShape="1">
-                <a:blip r:embed="rId15" cstate="print"/>
+              <a:blipFill>
+                <a:blip r:embed="rId15"/>
                 <a:stretch>
                   <a:fillRect/>
                 </a:stretch>
@@ -11487,8 +11438,8 @@
           </p:sp>
         </mc:Fallback>
       </mc:AlternateContent>
-      <mc:AlternateContent xmlns:mc="http://schemas.openxmlformats.org/markup-compatibility/2006" xmlns:a14="http://schemas.microsoft.com/office/drawing/2010/main">
-        <mc:Choice Requires="a14">
+      <mc:AlternateContent xmlns:mc="http://schemas.openxmlformats.org/markup-compatibility/2006">
+        <mc:Choice xmlns:a14="http://schemas.microsoft.com/office/drawing/2010/main" Requires="a14">
           <p:sp>
             <p:nvSpPr>
               <p:cNvPr id="88" name="TextBox 87"/>
@@ -11498,7 +11449,7 @@
             <p:spPr>
               <a:xfrm>
                 <a:off x="4191000" y="1705029"/>
-                <a:ext cx="1295400" cy="338554"/>
+                <a:ext cx="1295400" cy="461665"/>
               </a:xfrm>
               <a:prstGeom prst="rect">
                 <a:avLst/>
@@ -11528,8 +11479,8 @@
                   </m:oMath>
                 </a14:m>
                 <a:r>
-                  <a:rPr lang="en-US" altLang="zh-TW" sz="800" dirty="0" smtClean="0"/>
-                  <a:t>= shake frequency</a:t>
+                  <a:rPr lang="en-US" altLang="zh-TW" sz="800" dirty="0"/>
+                  <a:t>= frequency</a:t>
                 </a:r>
               </a:p>
               <a:p>
@@ -11550,15 +11501,69 @@
                   </m:oMath>
                 </a14:m>
                 <a:r>
-                  <a:rPr lang="en-US" altLang="zh-TW" sz="800" dirty="0" smtClean="0"/>
-                  <a:t>= shake duration</a:t>
+                  <a:rPr lang="en-US" altLang="zh-TW" sz="800" dirty="0"/>
+                  <a:t>= duration (</a:t>
+                </a:r>
+                <a:r>
+                  <a:rPr lang="en-US" altLang="zh-TW" sz="800" i="1" dirty="0" err="1"/>
+                  <a:t>mCycles</a:t>
+                </a:r>
+                <a:r>
+                  <a:rPr lang="en-US" altLang="zh-TW" sz="800" dirty="0"/>
+                  <a:t>)</a:t>
+                </a:r>
+              </a:p>
+              <a:p>
+                <a:r>
+                  <a:rPr lang="en-US" altLang="zh-TW" sz="800" dirty="0"/>
+                  <a:t>ω = </a:t>
+                </a:r>
+                <a14:m>
+                  <m:oMath xmlns:m="http://schemas.openxmlformats.org/officeDocument/2006/math">
+                    <m:r>
+                      <a:rPr lang="en-US" sz="800" i="1">
+                        <a:latin typeface="Cambria Math"/>
+                      </a:rPr>
+                      <m:t>2</m:t>
+                    </m:r>
+                    <m:r>
+                      <a:rPr lang="en-US" sz="800" i="1">
+                        <a:latin typeface="Cambria Math"/>
+                        <a:ea typeface="Cambria Math"/>
+                      </a:rPr>
+                      <m:t>𝜋</m:t>
+                    </m:r>
+                    <m:r>
+                      <a:rPr lang="en-US" sz="800" i="1">
+                        <a:latin typeface="Cambria Math"/>
+                        <a:ea typeface="Cambria Math"/>
+                      </a:rPr>
+                      <m:t>𝑓</m:t>
+                    </m:r>
+                  </m:oMath>
+                </a14:m>
+                <a:r>
+                  <a:rPr lang="zh-TW" altLang="en-US" sz="800" dirty="0"/>
+                  <a:t> </a:t>
+                </a:r>
+                <a:r>
+                  <a:rPr lang="en-US" altLang="zh-TW" sz="800" dirty="0"/>
+                  <a:t>(</a:t>
+                </a:r>
+                <a:r>
+                  <a:rPr lang="en-US" altLang="zh-TW" sz="800" i="1" dirty="0" err="1"/>
+                  <a:t>mOmega</a:t>
+                </a:r>
+                <a:r>
+                  <a:rPr lang="en-US" altLang="zh-TW" sz="800" dirty="0"/>
+                  <a:t>)</a:t>
                 </a:r>
                 <a:endParaRPr lang="zh-TW" altLang="en-US" sz="800" dirty="0"/>
               </a:p>
             </p:txBody>
           </p:sp>
         </mc:Choice>
-        <mc:Fallback xmlns="">
+        <mc:Fallback>
           <p:sp>
             <p:nvSpPr>
               <p:cNvPr id="88" name="TextBox 87"/>
@@ -11570,15 +11575,15 @@
             <p:spPr>
               <a:xfrm>
                 <a:off x="4191000" y="1705029"/>
-                <a:ext cx="1295400" cy="338554"/>
+                <a:ext cx="1295400" cy="461665"/>
               </a:xfrm>
               <a:prstGeom prst="rect">
                 <a:avLst/>
               </a:prstGeom>
-              <a:blipFill rotWithShape="1">
-                <a:blip r:embed="rId16" cstate="print"/>
+              <a:blipFill>
+                <a:blip r:embed="rId16"/>
                 <a:stretch>
-                  <a:fillRect b="-7273"/>
+                  <a:fillRect b="-5333"/>
                 </a:stretch>
               </a:blipFill>
             </p:spPr>
@@ -11694,7 +11699,7 @@
           <a:lstStyle/>
           <a:p>
             <a:r>
-              <a:rPr lang="en-US" altLang="zh-TW" sz="800" dirty="0" smtClean="0"/>
+              <a:rPr lang="en-US" altLang="zh-TW" sz="800" dirty="0"/>
               <a:t>(0,0)</a:t>
             </a:r>
             <a:endParaRPr lang="zh-TW" altLang="en-US" sz="800" baseline="-25000" dirty="0"/>
@@ -11981,7 +11986,7 @@
           <a:lstStyle/>
           <a:p>
             <a:r>
-              <a:rPr lang="en-US" altLang="zh-TW" sz="800" dirty="0" smtClean="0"/>
+              <a:rPr lang="en-US" altLang="zh-TW" sz="800" dirty="0"/>
               <a:t>Canvas</a:t>
             </a:r>
             <a:endParaRPr lang="zh-TW" altLang="en-US" sz="800" baseline="-25000" dirty="0"/>
@@ -12011,15 +12016,15 @@
           <a:lstStyle/>
           <a:p>
             <a:r>
-              <a:rPr lang="en-US" altLang="zh-TW" sz="800" dirty="0" smtClean="0"/>
+              <a:rPr lang="en-US" altLang="zh-TW" sz="800" dirty="0"/>
               <a:t>(</a:t>
             </a:r>
             <a:r>
-              <a:rPr lang="en-US" altLang="zh-TW" sz="800" dirty="0" err="1" smtClean="0"/>
+              <a:rPr lang="en-US" altLang="zh-TW" sz="800" dirty="0" err="1"/>
               <a:t>mouseX,mouseY</a:t>
             </a:r>
             <a:r>
-              <a:rPr lang="en-US" altLang="zh-TW" sz="800" dirty="0" smtClean="0"/>
+              <a:rPr lang="en-US" altLang="zh-TW" sz="800" dirty="0"/>
               <a:t>)</a:t>
             </a:r>
             <a:endParaRPr lang="zh-TW" altLang="en-US" sz="800" baseline="-25000" dirty="0"/>
@@ -12049,7 +12054,7 @@
           <a:lstStyle/>
           <a:p>
             <a:r>
-              <a:rPr lang="en-US" altLang="zh-TW" sz="800" dirty="0" err="1" smtClean="0"/>
+              <a:rPr lang="en-US" altLang="zh-TW" sz="800" dirty="0" err="1"/>
               <a:t>mouseY</a:t>
             </a:r>
             <a:endParaRPr lang="zh-TW" altLang="en-US" sz="800" baseline="-25000" dirty="0"/>
@@ -12079,7 +12084,7 @@
           <a:lstStyle/>
           <a:p>
             <a:r>
-              <a:rPr lang="en-US" altLang="zh-TW" sz="800" dirty="0" err="1" smtClean="0"/>
+              <a:rPr lang="en-US" altLang="zh-TW" sz="800" dirty="0" err="1"/>
               <a:t>mouseX</a:t>
             </a:r>
             <a:endParaRPr lang="zh-TW" altLang="en-US" sz="800" baseline="-25000" dirty="0"/>
@@ -12109,19 +12114,19 @@
           <a:lstStyle/>
           <a:p>
             <a:r>
-              <a:rPr lang="en-US" altLang="zh-TW" sz="800" dirty="0" err="1" smtClean="0"/>
+              <a:rPr lang="en-US" altLang="zh-TW" sz="800" dirty="0" err="1"/>
               <a:t>mouseDCY</a:t>
             </a:r>
             <a:r>
-              <a:rPr lang="en-US" altLang="zh-TW" sz="800" dirty="0" smtClean="0"/>
+              <a:rPr lang="en-US" altLang="zh-TW" sz="800" dirty="0"/>
               <a:t> = </a:t>
             </a:r>
             <a:r>
-              <a:rPr lang="en-US" altLang="zh-TW" sz="800" dirty="0" err="1" smtClean="0"/>
+              <a:rPr lang="en-US" altLang="zh-TW" sz="800" dirty="0" err="1"/>
               <a:t>mouseY-V</a:t>
             </a:r>
             <a:r>
-              <a:rPr lang="en-US" altLang="zh-TW" sz="800" baseline="-25000" dirty="0" err="1" smtClean="0"/>
+              <a:rPr lang="en-US" altLang="zh-TW" sz="800" baseline="-25000" dirty="0" err="1"/>
               <a:t>y</a:t>
             </a:r>
             <a:endParaRPr lang="zh-TW" altLang="en-US" sz="800" baseline="-25000" dirty="0"/>
@@ -12441,23 +12446,23 @@
           <a:lstStyle/>
           <a:p>
             <a:r>
-              <a:rPr lang="en-US" altLang="zh-TW" sz="800" dirty="0" smtClean="0"/>
+              <a:rPr lang="en-US" altLang="zh-TW" sz="800" dirty="0"/>
               <a:t>(</a:t>
             </a:r>
             <a:r>
-              <a:rPr lang="en-US" altLang="zh-TW" sz="800" dirty="0" err="1" smtClean="0"/>
+              <a:rPr lang="en-US" altLang="zh-TW" sz="800" dirty="0" err="1"/>
               <a:t>V</a:t>
             </a:r>
             <a:r>
-              <a:rPr lang="en-US" altLang="zh-TW" sz="800" baseline="-25000" dirty="0" err="1" smtClean="0"/>
+              <a:rPr lang="en-US" altLang="zh-TW" sz="800" baseline="-25000" dirty="0" err="1"/>
               <a:t>x</a:t>
             </a:r>
             <a:r>
-              <a:rPr lang="en-US" altLang="zh-TW" sz="800" dirty="0" err="1" smtClean="0"/>
+              <a:rPr lang="en-US" altLang="zh-TW" sz="800" dirty="0" err="1"/>
               <a:t>,V</a:t>
             </a:r>
             <a:r>
-              <a:rPr lang="en-US" altLang="zh-TW" sz="800" baseline="-25000" dirty="0" err="1" smtClean="0"/>
+              <a:rPr lang="en-US" altLang="zh-TW" sz="800" baseline="-25000" dirty="0" err="1"/>
               <a:t>y</a:t>
             </a:r>
             <a:r>
@@ -12491,11 +12496,11 @@
           <a:lstStyle/>
           <a:p>
             <a:r>
-              <a:rPr lang="en-US" altLang="zh-TW" sz="800" dirty="0" err="1" smtClean="0"/>
+              <a:rPr lang="en-US" altLang="zh-TW" sz="800" dirty="0" err="1"/>
               <a:t>H</a:t>
             </a:r>
             <a:r>
-              <a:rPr lang="en-US" altLang="zh-TW" sz="800" baseline="-25000" dirty="0" err="1" smtClean="0"/>
+              <a:rPr lang="en-US" altLang="zh-TW" sz="800" baseline="-25000" dirty="0" err="1"/>
               <a:t>v</a:t>
             </a:r>
             <a:endParaRPr lang="zh-TW" altLang="en-US" sz="800" baseline="-25000" dirty="0"/>
@@ -12525,7 +12530,7 @@
           <a:lstStyle/>
           <a:p>
             <a:r>
-              <a:rPr lang="en-US" altLang="zh-TW" sz="800" dirty="0" err="1" smtClean="0"/>
+              <a:rPr lang="en-US" altLang="zh-TW" sz="800" dirty="0" err="1"/>
               <a:t>W</a:t>
             </a:r>
             <a:r>
@@ -12559,7 +12564,7 @@
           <a:lstStyle/>
           <a:p>
             <a:r>
-              <a:rPr lang="en-US" altLang="zh-TW" sz="800" dirty="0" smtClean="0"/>
+              <a:rPr lang="en-US" altLang="zh-TW" sz="800" dirty="0"/>
               <a:t>Canvas</a:t>
             </a:r>
             <a:endParaRPr lang="zh-TW" altLang="en-US" sz="800" baseline="-25000" dirty="0"/>
@@ -12589,7 +12594,7 @@
           <a:lstStyle/>
           <a:p>
             <a:r>
-              <a:rPr lang="en-US" altLang="zh-TW" sz="800" dirty="0" smtClean="0"/>
+              <a:rPr lang="en-US" altLang="zh-TW" sz="800" dirty="0"/>
               <a:t>Viewport</a:t>
             </a:r>
             <a:endParaRPr lang="zh-TW" altLang="en-US" sz="800" baseline="-25000" dirty="0"/>
@@ -12713,19 +12718,19 @@
           <a:lstStyle/>
           <a:p>
             <a:r>
-              <a:rPr lang="en-US" altLang="zh-TW" sz="800" dirty="0" err="1" smtClean="0"/>
+              <a:rPr lang="en-US" altLang="zh-TW" sz="800" dirty="0" err="1"/>
               <a:t>mouseDCX</a:t>
             </a:r>
             <a:r>
-              <a:rPr lang="en-US" altLang="zh-TW" sz="800" dirty="0" smtClean="0"/>
+              <a:rPr lang="en-US" altLang="zh-TW" sz="800" dirty="0"/>
               <a:t> = </a:t>
             </a:r>
             <a:r>
-              <a:rPr lang="en-US" altLang="zh-TW" sz="800" dirty="0" err="1" smtClean="0"/>
+              <a:rPr lang="en-US" altLang="zh-TW" sz="800" dirty="0" err="1"/>
               <a:t>mouseX-V</a:t>
             </a:r>
             <a:r>
-              <a:rPr lang="en-US" altLang="zh-TW" sz="800" baseline="-25000" dirty="0" err="1" smtClean="0"/>
+              <a:rPr lang="en-US" altLang="zh-TW" sz="800" baseline="-25000" dirty="0" err="1"/>
               <a:t>x</a:t>
             </a:r>
             <a:endParaRPr lang="zh-TW" altLang="en-US" sz="800" baseline="-25000" dirty="0"/>
@@ -12755,15 +12760,15 @@
           <a:lstStyle/>
           <a:p>
             <a:r>
-              <a:rPr lang="en-US" altLang="zh-TW" sz="800" dirty="0" smtClean="0"/>
+              <a:rPr lang="en-US" altLang="zh-TW" sz="800" dirty="0"/>
               <a:t>(</a:t>
             </a:r>
             <a:r>
-              <a:rPr lang="en-US" altLang="zh-TW" sz="800" dirty="0" err="1" smtClean="0"/>
+              <a:rPr lang="en-US" altLang="zh-TW" sz="800" dirty="0" err="1"/>
               <a:t>mouseX,mouseY</a:t>
             </a:r>
             <a:r>
-              <a:rPr lang="en-US" altLang="zh-TW" sz="800" dirty="0" smtClean="0"/>
+              <a:rPr lang="en-US" altLang="zh-TW" sz="800" dirty="0"/>
               <a:t>)</a:t>
             </a:r>
             <a:endParaRPr lang="zh-TW" altLang="en-US" sz="800" baseline="-25000" dirty="0"/>
@@ -13147,11 +13152,11 @@
           <a:lstStyle/>
           <a:p>
             <a:r>
-              <a:rPr lang="en-US" altLang="zh-TW" sz="800" dirty="0" err="1" smtClean="0"/>
+              <a:rPr lang="en-US" altLang="zh-TW" sz="800" dirty="0" err="1"/>
               <a:t>mouseDCY</a:t>
             </a:r>
             <a:r>
-              <a:rPr lang="en-US" altLang="zh-TW" sz="800" dirty="0" smtClean="0"/>
+              <a:rPr lang="en-US" altLang="zh-TW" sz="800" dirty="0"/>
               <a:t> </a:t>
             </a:r>
             <a:endParaRPr lang="zh-TW" altLang="en-US" sz="800" baseline="-25000" dirty="0"/>
@@ -13425,23 +13430,23 @@
           <a:lstStyle/>
           <a:p>
             <a:r>
-              <a:rPr lang="en-US" altLang="zh-TW" sz="800" dirty="0" smtClean="0"/>
+              <a:rPr lang="en-US" altLang="zh-TW" sz="800" dirty="0"/>
               <a:t>(</a:t>
             </a:r>
             <a:r>
-              <a:rPr lang="en-US" altLang="zh-TW" sz="800" dirty="0" err="1" smtClean="0"/>
+              <a:rPr lang="en-US" altLang="zh-TW" sz="800" dirty="0" err="1"/>
               <a:t>V</a:t>
             </a:r>
             <a:r>
-              <a:rPr lang="en-US" altLang="zh-TW" sz="800" baseline="-25000" dirty="0" err="1" smtClean="0"/>
+              <a:rPr lang="en-US" altLang="zh-TW" sz="800" baseline="-25000" dirty="0" err="1"/>
               <a:t>x</a:t>
             </a:r>
             <a:r>
-              <a:rPr lang="en-US" altLang="zh-TW" sz="800" dirty="0" err="1" smtClean="0"/>
+              <a:rPr lang="en-US" altLang="zh-TW" sz="800" dirty="0" err="1"/>
               <a:t>,V</a:t>
             </a:r>
             <a:r>
-              <a:rPr lang="en-US" altLang="zh-TW" sz="800" baseline="-25000" dirty="0" err="1" smtClean="0"/>
+              <a:rPr lang="en-US" altLang="zh-TW" sz="800" baseline="-25000" dirty="0" err="1"/>
               <a:t>y</a:t>
             </a:r>
             <a:r>
@@ -13475,11 +13480,11 @@
           <a:lstStyle/>
           <a:p>
             <a:r>
-              <a:rPr lang="en-US" altLang="zh-TW" sz="800" dirty="0" err="1" smtClean="0"/>
+              <a:rPr lang="en-US" altLang="zh-TW" sz="800" dirty="0" err="1"/>
               <a:t>H</a:t>
             </a:r>
             <a:r>
-              <a:rPr lang="en-US" altLang="zh-TW" sz="800" baseline="-25000" dirty="0" err="1" smtClean="0"/>
+              <a:rPr lang="en-US" altLang="zh-TW" sz="800" baseline="-25000" dirty="0" err="1"/>
               <a:t>v</a:t>
             </a:r>
             <a:endParaRPr lang="zh-TW" altLang="en-US" sz="800" baseline="-25000" dirty="0"/>
@@ -13509,7 +13514,7 @@
           <a:lstStyle/>
           <a:p>
             <a:r>
-              <a:rPr lang="en-US" altLang="zh-TW" sz="800" dirty="0" err="1" smtClean="0"/>
+              <a:rPr lang="en-US" altLang="zh-TW" sz="800" dirty="0" err="1"/>
               <a:t>W</a:t>
             </a:r>
             <a:r>
@@ -13543,7 +13548,7 @@
           <a:lstStyle/>
           <a:p>
             <a:r>
-              <a:rPr lang="en-US" altLang="zh-TW" sz="800" dirty="0" smtClean="0"/>
+              <a:rPr lang="en-US" altLang="zh-TW" sz="800" dirty="0"/>
               <a:t>Device Coordinate Space</a:t>
             </a:r>
             <a:endParaRPr lang="zh-TW" altLang="en-US" sz="800" baseline="-25000" dirty="0"/>
@@ -13573,7 +13578,7 @@
           <a:lstStyle/>
           <a:p>
             <a:r>
-              <a:rPr lang="en-US" altLang="zh-TW" sz="800" dirty="0" smtClean="0"/>
+              <a:rPr lang="en-US" altLang="zh-TW" sz="800" dirty="0"/>
               <a:t>Viewport</a:t>
             </a:r>
             <a:endParaRPr lang="zh-TW" altLang="en-US" sz="800" baseline="-25000" dirty="0"/>
@@ -13603,7 +13608,7 @@
           <a:lstStyle/>
           <a:p>
             <a:r>
-              <a:rPr lang="en-US" altLang="zh-TW" sz="800" dirty="0" err="1" smtClean="0"/>
+              <a:rPr lang="en-US" altLang="zh-TW" sz="800" dirty="0" err="1"/>
               <a:t>mouseDCX</a:t>
             </a:r>
             <a:endParaRPr lang="zh-TW" altLang="en-US" sz="800" baseline="-25000" dirty="0"/>
@@ -13633,7 +13638,7 @@
           <a:lstStyle/>
           <a:p>
             <a:r>
-              <a:rPr lang="en-US" altLang="zh-TW" sz="800" dirty="0" smtClean="0"/>
+              <a:rPr lang="en-US" altLang="zh-TW" sz="800" dirty="0"/>
               <a:t>World Coordinate Space</a:t>
             </a:r>
             <a:endParaRPr lang="zh-TW" altLang="en-US" sz="800" baseline="-25000" dirty="0"/>
@@ -13663,11 +13668,11 @@
           <a:lstStyle/>
           <a:p>
             <a:r>
-              <a:rPr lang="en-US" altLang="zh-TW" sz="800" dirty="0" err="1" smtClean="0"/>
+              <a:rPr lang="en-US" altLang="zh-TW" sz="800" dirty="0" err="1"/>
               <a:t>W</a:t>
             </a:r>
             <a:r>
-              <a:rPr lang="en-US" altLang="zh-TW" sz="800" baseline="-25000" dirty="0" err="1" smtClean="0"/>
+              <a:rPr lang="en-US" altLang="zh-TW" sz="800" baseline="-25000" dirty="0" err="1"/>
               <a:t>wc</a:t>
             </a:r>
             <a:endParaRPr lang="zh-TW" altLang="en-US" sz="800" baseline="-25000" dirty="0"/>
@@ -13699,23 +13704,23 @@
               <a:lstStyle/>
               <a:p>
                 <a:r>
-                  <a:rPr lang="en-US" altLang="zh-TW" sz="800" dirty="0" smtClean="0"/>
+                  <a:rPr lang="en-US" altLang="zh-TW" sz="800" dirty="0"/>
                   <a:t>mouseWCY = </a:t>
                 </a:r>
                 <a:r>
-                  <a:rPr lang="en-US" altLang="zh-TW" sz="800" dirty="0" err="1" smtClean="0"/>
+                  <a:rPr lang="en-US" altLang="zh-TW" sz="800" dirty="0" err="1"/>
                   <a:t>minWCY</a:t>
                 </a:r>
                 <a:r>
-                  <a:rPr lang="en-US" altLang="zh-TW" sz="800" dirty="0" smtClean="0"/>
+                  <a:rPr lang="en-US" altLang="zh-TW" sz="800" dirty="0"/>
                   <a:t>+ (</a:t>
                 </a:r>
                 <a:r>
-                  <a:rPr lang="en-US" altLang="zh-TW" sz="800" dirty="0" err="1" smtClean="0"/>
+                  <a:rPr lang="en-US" altLang="zh-TW" sz="800" dirty="0" err="1"/>
                   <a:t>mouseDCY</a:t>
                 </a:r>
                 <a:r>
-                  <a:rPr lang="en-US" altLang="zh-TW" sz="800" dirty="0" smtClean="0"/>
+                  <a:rPr lang="en-US" altLang="zh-TW" sz="800" dirty="0"/>
                   <a:t> </a:t>
                 </a:r>
                 <a14:m>
@@ -13772,7 +13777,7 @@
                   </m:oMath>
                 </a14:m>
                 <a:r>
-                  <a:rPr lang="en-US" altLang="zh-TW" sz="800" dirty="0" smtClean="0"/>
+                  <a:rPr lang="en-US" altLang="zh-TW" sz="800" dirty="0"/>
                   <a:t>)</a:t>
                 </a:r>
                 <a:endParaRPr lang="zh-TW" altLang="en-US" sz="800" baseline="-25000" dirty="0"/>
@@ -13842,15 +13847,15 @@
           <a:lstStyle/>
           <a:p>
             <a:r>
-              <a:rPr lang="en-US" altLang="zh-TW" sz="800" dirty="0" smtClean="0"/>
+              <a:rPr lang="en-US" altLang="zh-TW" sz="800" dirty="0"/>
               <a:t>(</a:t>
             </a:r>
             <a:r>
-              <a:rPr lang="en-US" altLang="zh-TW" sz="800" dirty="0" err="1" smtClean="0"/>
+              <a:rPr lang="en-US" altLang="zh-TW" sz="800" dirty="0" err="1"/>
               <a:t>minWCX,minWCY</a:t>
             </a:r>
             <a:r>
-              <a:rPr lang="en-US" altLang="zh-TW" sz="800" dirty="0" smtClean="0"/>
+              <a:rPr lang="en-US" altLang="zh-TW" sz="800" dirty="0"/>
               <a:t>)</a:t>
             </a:r>
             <a:endParaRPr lang="zh-TW" altLang="en-US" sz="800" baseline="-25000" dirty="0"/>
@@ -14167,11 +14172,11 @@
           <a:lstStyle/>
           <a:p>
             <a:r>
-              <a:rPr lang="en-US" altLang="zh-TW" sz="800" dirty="0" err="1" smtClean="0"/>
+              <a:rPr lang="en-US" altLang="zh-TW" sz="800" dirty="0" err="1"/>
               <a:t>H</a:t>
             </a:r>
             <a:r>
-              <a:rPr lang="en-US" altLang="zh-TW" sz="800" baseline="-25000" dirty="0" err="1" smtClean="0"/>
+              <a:rPr lang="en-US" altLang="zh-TW" sz="800" baseline="-25000" dirty="0" err="1"/>
               <a:t>wc</a:t>
             </a:r>
             <a:endParaRPr lang="zh-TW" altLang="en-US" sz="800" baseline="-25000" dirty="0"/>
@@ -14253,27 +14258,27 @@
               <a:lstStyle/>
               <a:p>
                 <a:r>
-                  <a:rPr lang="en-US" altLang="zh-TW" sz="800" dirty="0" err="1" smtClean="0"/>
+                  <a:rPr lang="en-US" altLang="zh-TW" sz="800" dirty="0" err="1"/>
                   <a:t>mouseWCX</a:t>
                 </a:r>
                 <a:r>
-                  <a:rPr lang="en-US" altLang="zh-TW" sz="800" dirty="0" smtClean="0"/>
+                  <a:rPr lang="en-US" altLang="zh-TW" sz="800" dirty="0"/>
                   <a:t> = </a:t>
                 </a:r>
                 <a:r>
-                  <a:rPr lang="en-US" altLang="zh-TW" sz="800" dirty="0" err="1" smtClean="0"/>
+                  <a:rPr lang="en-US" altLang="zh-TW" sz="800" dirty="0" err="1"/>
                   <a:t>minWCX</a:t>
                 </a:r>
                 <a:r>
-                  <a:rPr lang="en-US" altLang="zh-TW" sz="800" dirty="0" smtClean="0"/>
+                  <a:rPr lang="en-US" altLang="zh-TW" sz="800" dirty="0"/>
                   <a:t>+ (</a:t>
                 </a:r>
                 <a:r>
-                  <a:rPr lang="en-US" altLang="zh-TW" sz="800" dirty="0" err="1" smtClean="0"/>
+                  <a:rPr lang="en-US" altLang="zh-TW" sz="800" dirty="0" err="1"/>
                   <a:t>mouseDC</a:t>
                 </a:r>
                 <a:r>
-                  <a:rPr lang="en-US" altLang="zh-TW" sz="800" dirty="0" smtClean="0"/>
+                  <a:rPr lang="en-US" altLang="zh-TW" sz="800" dirty="0"/>
                   <a:t>X </a:t>
                 </a:r>
                 <a14:m>
@@ -14330,7 +14335,7 @@
                   </m:oMath>
                 </a14:m>
                 <a:r>
-                  <a:rPr lang="en-US" altLang="zh-TW" sz="800" dirty="0" smtClean="0"/>
+                  <a:rPr lang="en-US" altLang="zh-TW" sz="800" dirty="0"/>
                   <a:t>)</a:t>
                 </a:r>
                 <a:endParaRPr lang="zh-TW" altLang="en-US" sz="800" baseline="-25000" dirty="0"/>

</xml_diff>